<commit_message>
Try to modify code in order to make unit test.
</commit_message>
<xml_diff>
--- a/Webapps.pptx
+++ b/Webapps.pptx
@@ -321,7 +321,7 @@
           <a:p>
             <a:fld id="{458B1E0F-B499-4DB6-96B1-614D9FA51AF9}" type="datetimeFigureOut">
               <a:rPr lang="zh-TW" altLang="en-US" smtClean="0"/>
-              <a:t>2015/12/4</a:t>
+              <a:t>2015/12/8</a:t>
             </a:fld>
             <a:endParaRPr lang="zh-TW" altLang="en-US"/>
           </a:p>
@@ -606,7 +606,7 @@
           <a:p>
             <a:fld id="{458B1E0F-B499-4DB6-96B1-614D9FA51AF9}" type="datetimeFigureOut">
               <a:rPr lang="zh-TW" altLang="en-US" smtClean="0"/>
-              <a:t>2015/12/4</a:t>
+              <a:t>2015/12/8</a:t>
             </a:fld>
             <a:endParaRPr lang="zh-TW" altLang="en-US"/>
           </a:p>
@@ -902,7 +902,7 @@
           <a:p>
             <a:fld id="{458B1E0F-B499-4DB6-96B1-614D9FA51AF9}" type="datetimeFigureOut">
               <a:rPr lang="zh-TW" altLang="en-US" smtClean="0"/>
-              <a:t>2015/12/4</a:t>
+              <a:t>2015/12/8</a:t>
             </a:fld>
             <a:endParaRPr lang="zh-TW" altLang="en-US"/>
           </a:p>
@@ -1189,7 +1189,7 @@
           <a:p>
             <a:fld id="{458B1E0F-B499-4DB6-96B1-614D9FA51AF9}" type="datetimeFigureOut">
               <a:rPr lang="zh-TW" altLang="en-US" smtClean="0"/>
-              <a:t>2015/12/4</a:t>
+              <a:t>2015/12/8</a:t>
             </a:fld>
             <a:endParaRPr lang="zh-TW" altLang="en-US"/>
           </a:p>
@@ -1409,7 +1409,7 @@
           <a:p>
             <a:fld id="{458B1E0F-B499-4DB6-96B1-614D9FA51AF9}" type="datetimeFigureOut">
               <a:rPr lang="zh-TW" altLang="en-US" smtClean="0"/>
-              <a:t>2015/12/4</a:t>
+              <a:t>2015/12/8</a:t>
             </a:fld>
             <a:endParaRPr lang="zh-TW" altLang="en-US"/>
           </a:p>
@@ -1805,17 +1805,7 @@
                 <a:latin typeface="華康粗圓體" panose="020F0709000000000000" pitchFamily="49" charset="-120"/>
                 <a:ea typeface="華康粗圓體" panose="020F0709000000000000" pitchFamily="49" charset="-120"/>
               </a:rPr>
-              <a:t>資工三  </a:t>
-            </a:r>
-            <a:r>
-              <a:rPr lang="zh-TW" altLang="en-US" dirty="0" smtClean="0">
-                <a:solidFill>
-                  <a:schemeClr val="bg1"/>
-                </a:solidFill>
-                <a:latin typeface="華康粗圓體" panose="020F0709000000000000" pitchFamily="49" charset="-120"/>
-                <a:ea typeface="華康粗圓體" panose="020F0709000000000000" pitchFamily="49" charset="-120"/>
-              </a:rPr>
-              <a:t>韓文彬</a:t>
+              <a:t>資工三  韓文彬</a:t>
             </a:r>
             <a:endParaRPr lang="en-US" dirty="0">
               <a:solidFill>
@@ -2626,11 +2616,7 @@
           <a:p>
             <a:r>
               <a:rPr lang="en-US" altLang="zh-TW" sz="6600" b="1" dirty="0" smtClean="0"/>
-              <a:t>Thanks for </a:t>
-            </a:r>
-            <a:r>
-              <a:rPr lang="en-US" altLang="zh-TW" sz="6600" b="1" dirty="0" smtClean="0"/>
-              <a:t>Listening!</a:t>
+              <a:t>Thanks for Listening!</a:t>
             </a:r>
             <a:endParaRPr lang="zh-TW" altLang="en-US" sz="6600" b="1" dirty="0"/>
           </a:p>

</xml_diff>